<commit_message>
Update Sustentacion proyecto inventario.pptx
</commit_message>
<xml_diff>
--- a/Documentacion/1er_Trim/Sustentacion proyecto inventario.pptx
+++ b/Documentacion/1er_Trim/Sustentacion proyecto inventario.pptx
@@ -6447,7 +6447,7 @@
         <p:spPr>
           <a:xfrm>
             <a:off x="382867" y="2393064"/>
-            <a:ext cx="8347475" cy="2646878"/>
+            <a:ext cx="8347475" cy="2185214"/>
           </a:xfrm>
           <a:prstGeom prst="rect">
             <a:avLst/>
@@ -6534,40 +6534,6 @@
                 </a:solidFill>
               </a:rPr>
               <a:t>Diseñar y estructurar el inventario web con técnicas de programación con php y css para estilos y diseño </a:t>
-            </a:r>
-          </a:p>
-          <a:p>
-            <a:pPr marL="800100" lvl="1" indent="-342900">
-              <a:buFont typeface="Arial" panose="020B0604020202020204" pitchFamily="34" charset="0"/>
-              <a:buChar char="•"/>
-            </a:pPr>
-            <a:r>
-              <a:rPr lang="es-ES" sz="1500" dirty="0">
-                <a:solidFill>
-                  <a:schemeClr val="tx1">
-                    <a:lumMod val="75000"/>
-                    <a:lumOff val="25000"/>
-                  </a:schemeClr>
-                </a:solidFill>
-              </a:rPr>
-              <a:t>Hacer pruebas de caja negra y caja blanca para visualizar errores y funciones del programa</a:t>
-            </a:r>
-          </a:p>
-          <a:p>
-            <a:pPr marL="800100" lvl="1" indent="-342900">
-              <a:buFont typeface="Arial" panose="020B0604020202020204" pitchFamily="34" charset="0"/>
-              <a:buChar char="•"/>
-            </a:pPr>
-            <a:r>
-              <a:rPr lang="es-ES" sz="1500" dirty="0">
-                <a:solidFill>
-                  <a:schemeClr val="tx1">
-                    <a:lumMod val="75000"/>
-                    <a:lumOff val="25000"/>
-                  </a:schemeClr>
-                </a:solidFill>
-              </a:rPr>
-              <a:t>Entregar el producto final para su respectiva calificación </a:t>
             </a:r>
           </a:p>
           <a:p>

</xml_diff>